<commit_message>
Se agrega nuevo archivo: renombrar pdf
</commit_message>
<xml_diff>
--- a/rutinas.pptx
+++ b/rutinas.pptx
@@ -118,18 +118,18 @@
   <pc:docChgLst>
     <pc:chgData name="Carlos Alvear" userId="5dc9c09c97c1c854" providerId="LiveId" clId="{DFFDA707-0827-449C-B6ED-C474B0764CFB}"/>
     <pc:docChg chg="modSld">
-      <pc:chgData name="Carlos Alvear" userId="5dc9c09c97c1c854" providerId="LiveId" clId="{DFFDA707-0827-449C-B6ED-C474B0764CFB}" dt="2024-11-26T20:43:44.238" v="3" actId="13926"/>
+      <pc:chgData name="Carlos Alvear" userId="5dc9c09c97c1c854" providerId="LiveId" clId="{DFFDA707-0827-449C-B6ED-C474B0764CFB}" dt="2024-11-30T16:12:30.445" v="4" actId="14734"/>
       <pc:docMkLst>
         <pc:docMk/>
       </pc:docMkLst>
       <pc:sldChg chg="modSp mod">
-        <pc:chgData name="Carlos Alvear" userId="5dc9c09c97c1c854" providerId="LiveId" clId="{DFFDA707-0827-449C-B6ED-C474B0764CFB}" dt="2024-11-26T20:43:44.238" v="3" actId="13926"/>
+        <pc:chgData name="Carlos Alvear" userId="5dc9c09c97c1c854" providerId="LiveId" clId="{DFFDA707-0827-449C-B6ED-C474B0764CFB}" dt="2024-11-30T16:12:30.445" v="4" actId="14734"/>
         <pc:sldMkLst>
           <pc:docMk/>
           <pc:sldMk cId="3142112342" sldId="258"/>
         </pc:sldMkLst>
         <pc:graphicFrameChg chg="modGraphic">
-          <ac:chgData name="Carlos Alvear" userId="5dc9c09c97c1c854" providerId="LiveId" clId="{DFFDA707-0827-449C-B6ED-C474B0764CFB}" dt="2024-11-26T20:43:44.238" v="3" actId="13926"/>
+          <ac:chgData name="Carlos Alvear" userId="5dc9c09c97c1c854" providerId="LiveId" clId="{DFFDA707-0827-449C-B6ED-C474B0764CFB}" dt="2024-11-30T16:12:30.445" v="4" actId="14734"/>
           <ac:graphicFrameMkLst>
             <pc:docMk/>
             <pc:sldMk cId="3142112342" sldId="258"/>
@@ -291,7 +291,7 @@
           <a:p>
             <a:fld id="{BE2144EC-0BCD-47E9-AA73-16634885B97D}" type="datetimeFigureOut">
               <a:rPr lang="es-CL" smtClean="0"/>
-              <a:t>26-11-2024</a:t>
+              <a:t>30-11-2024</a:t>
             </a:fld>
             <a:endParaRPr lang="es-CL"/>
           </a:p>
@@ -491,7 +491,7 @@
           <a:p>
             <a:fld id="{BE2144EC-0BCD-47E9-AA73-16634885B97D}" type="datetimeFigureOut">
               <a:rPr lang="es-CL" smtClean="0"/>
-              <a:t>26-11-2024</a:t>
+              <a:t>30-11-2024</a:t>
             </a:fld>
             <a:endParaRPr lang="es-CL"/>
           </a:p>
@@ -701,7 +701,7 @@
           <a:p>
             <a:fld id="{BE2144EC-0BCD-47E9-AA73-16634885B97D}" type="datetimeFigureOut">
               <a:rPr lang="es-CL" smtClean="0"/>
-              <a:t>26-11-2024</a:t>
+              <a:t>30-11-2024</a:t>
             </a:fld>
             <a:endParaRPr lang="es-CL"/>
           </a:p>
@@ -901,7 +901,7 @@
           <a:p>
             <a:fld id="{BE2144EC-0BCD-47E9-AA73-16634885B97D}" type="datetimeFigureOut">
               <a:rPr lang="es-CL" smtClean="0"/>
-              <a:t>26-11-2024</a:t>
+              <a:t>30-11-2024</a:t>
             </a:fld>
             <a:endParaRPr lang="es-CL"/>
           </a:p>
@@ -1177,7 +1177,7 @@
           <a:p>
             <a:fld id="{BE2144EC-0BCD-47E9-AA73-16634885B97D}" type="datetimeFigureOut">
               <a:rPr lang="es-CL" smtClean="0"/>
-              <a:t>26-11-2024</a:t>
+              <a:t>30-11-2024</a:t>
             </a:fld>
             <a:endParaRPr lang="es-CL"/>
           </a:p>
@@ -1445,7 +1445,7 @@
           <a:p>
             <a:fld id="{BE2144EC-0BCD-47E9-AA73-16634885B97D}" type="datetimeFigureOut">
               <a:rPr lang="es-CL" smtClean="0"/>
-              <a:t>26-11-2024</a:t>
+              <a:t>30-11-2024</a:t>
             </a:fld>
             <a:endParaRPr lang="es-CL"/>
           </a:p>
@@ -1860,7 +1860,7 @@
           <a:p>
             <a:fld id="{BE2144EC-0BCD-47E9-AA73-16634885B97D}" type="datetimeFigureOut">
               <a:rPr lang="es-CL" smtClean="0"/>
-              <a:t>26-11-2024</a:t>
+              <a:t>30-11-2024</a:t>
             </a:fld>
             <a:endParaRPr lang="es-CL"/>
           </a:p>
@@ -2002,7 +2002,7 @@
           <a:p>
             <a:fld id="{BE2144EC-0BCD-47E9-AA73-16634885B97D}" type="datetimeFigureOut">
               <a:rPr lang="es-CL" smtClean="0"/>
-              <a:t>26-11-2024</a:t>
+              <a:t>30-11-2024</a:t>
             </a:fld>
             <a:endParaRPr lang="es-CL"/>
           </a:p>
@@ -2115,7 +2115,7 @@
           <a:p>
             <a:fld id="{BE2144EC-0BCD-47E9-AA73-16634885B97D}" type="datetimeFigureOut">
               <a:rPr lang="es-CL" smtClean="0"/>
-              <a:t>26-11-2024</a:t>
+              <a:t>30-11-2024</a:t>
             </a:fld>
             <a:endParaRPr lang="es-CL"/>
           </a:p>
@@ -2428,7 +2428,7 @@
           <a:p>
             <a:fld id="{BE2144EC-0BCD-47E9-AA73-16634885B97D}" type="datetimeFigureOut">
               <a:rPr lang="es-CL" smtClean="0"/>
-              <a:t>26-11-2024</a:t>
+              <a:t>30-11-2024</a:t>
             </a:fld>
             <a:endParaRPr lang="es-CL"/>
           </a:p>
@@ -2717,7 +2717,7 @@
           <a:p>
             <a:fld id="{BE2144EC-0BCD-47E9-AA73-16634885B97D}" type="datetimeFigureOut">
               <a:rPr lang="es-CL" smtClean="0"/>
-              <a:t>26-11-2024</a:t>
+              <a:t>30-11-2024</a:t>
             </a:fld>
             <a:endParaRPr lang="es-CL"/>
           </a:p>
@@ -2960,7 +2960,7 @@
           <a:p>
             <a:fld id="{BE2144EC-0BCD-47E9-AA73-16634885B97D}" type="datetimeFigureOut">
               <a:rPr lang="es-CL" smtClean="0"/>
-              <a:t>26-11-2024</a:t>
+              <a:t>30-11-2024</a:t>
             </a:fld>
             <a:endParaRPr lang="es-CL"/>
           </a:p>
@@ -4534,7 +4534,7 @@
           <p:nvPr>
             <p:extLst>
               <p:ext uri="{D42A27DB-BD31-4B8C-83A1-F6EECF244321}">
-                <p14:modId xmlns:p14="http://schemas.microsoft.com/office/powerpoint/2010/main" val="2278384324"/>
+                <p14:modId xmlns:p14="http://schemas.microsoft.com/office/powerpoint/2010/main" val="3351275820"/>
               </p:ext>
             </p:extLst>
           </p:nvPr>
@@ -4550,14 +4550,14 @@
                 <a:tableStyleId>{5C22544A-7EE6-4342-B048-85BDC9FD1C3A}</a:tableStyleId>
               </a:tblPr>
               <a:tblGrid>
-                <a:gridCol w="3004456">
+                <a:gridCol w="2998839">
                   <a:extLst>
                     <a:ext uri="{9D8B030D-6E8A-4147-A177-3AD203B41FA5}">
                       <a16:colId xmlns:a16="http://schemas.microsoft.com/office/drawing/2014/main" val="3230465392"/>
                     </a:ext>
                   </a:extLst>
                 </a:gridCol>
-                <a:gridCol w="1793686">
+                <a:gridCol w="1799303">
                   <a:extLst>
                     <a:ext uri="{9D8B030D-6E8A-4147-A177-3AD203B41FA5}">
                       <a16:colId xmlns:a16="http://schemas.microsoft.com/office/drawing/2014/main" val="1943418549"/>

</xml_diff>